<commit_message>
Improve slides for presentation best practices
- Reduce text on slides - short phrases instead of paragraphs
- Keep tables (they work well!)
- Fix word cutoff bug in PowerPoint conversion script
- Fix quote formatting in conversion script
- Speaker notes contain the detailed talking points
- Regenerate PDF and PowerPoint exports

🤖 Generated with [Claude Code](https://claude.com/claude-code)

Co-Authored-By: Claude Opus 4.5 <noreply@anthropic.com>
</commit_message>
<xml_diff>
--- a/lessons/01-james-baldwin-civil-rights/slides.pptx
+++ b/lessons/01-james-baldwin-civil-rights/slides.pptx
@@ -515,7 +515,7 @@
           <a:lstStyle/>
           <a:p>
             <a:r>
-              <a:t>This is the heart of the lesson. Everything else supports this core insight.</a:t>
+              <a:t>This is the core insight. Teaching civil rights isn't about facts and dates—it's about helping students feel part of an ongoing story. Baldwin showed us how: personal stories + present relevance.</a:t>
             </a:r>
           </a:p>
         </p:txBody>
@@ -585,7 +585,7 @@
           <a:lstStyle/>
           <a:p>
             <a:r>
-              <a:t>Every teacher makes some of these mistakes. Awareness helps you catch and correct.</a:t>
+              <a:t>Every teacher makes some of these. Awareness helps you catch and correct. The balanced approach: honest about difficulty, clear about progress, open to student responses.</a:t>
             </a:r>
           </a:p>
         </p:txBody>
@@ -655,7 +655,7 @@
           <a:lstStyle/>
           <a:p>
             <a:r>
-              <a:t>Summarize before group work. This frames what they should discuss.</a:t>
+              <a:t>Summarize before group work. This frames what they should discuss in their groups.</a:t>
             </a:r>
           </a:p>
         </p:txBody>
@@ -725,7 +725,7 @@
           <a:lstStyle/>
           <a:p>
             <a:r>
-              <a:t>Circulate actively. Ask "Why?" and "What if?" to push thinking.</a:t>
+              <a:t>Circulate actively. Ask "Why?" and "What if?" to push thinking. Look for connections between today's ideas and their future teaching.</a:t>
             </a:r>
           </a:p>
         </p:txBody>
@@ -865,7 +865,7 @@
           <a:lstStyle/>
           <a:p>
             <a:r>
-              <a:t>Emphasize: Baldwin is a model for HOW to teach, not just WHAT to teach.</a:t>
+              <a:t>Born in Harlem. His approach—connecting abstract history to real human experience—is exactly what good teaching looks like. He's a model for HOW to teach, not just WHAT to teach.</a:t>
             </a:r>
           </a:p>
         </p:txBody>
@@ -935,7 +935,7 @@
           <a:lstStyle/>
           <a:p>
             <a:r>
-              <a:t>This distinction (what it IS vs. what it is NOT) is crucial. Many teachers get stuck in the "not" column.</a:t>
+              <a:t>This changes everything. Civil rights isn't a chapter to get through—it's happening now. Your students live in a world shaped by this history. When we teach civil rights, we help them understand their world.</a:t>
             </a:r>
           </a:p>
         </p:txBody>
@@ -1005,7 +1005,7 @@
           <a:lstStyle/>
           <a:p>
             <a:r>
-              <a:t>The topic is the same; the entry point changes. This is differentiation (adjusting instruction for different learners) in action.</a:t>
+              <a:t>Same topic, different entry points. This is differentiation in action. You adjust complexity, never importance.</a:t>
             </a:r>
           </a:p>
         </p:txBody>
@@ -1075,7 +1075,7 @@
           <a:lstStyle/>
           <a:p>
             <a:r>
-              <a:t>Questions open minds; lectures close them. But questions must eventually lead somewhere.</a:t>
+              <a:t>Questions open minds; lectures close them. Questions work at EVERY grade level. They honor what students already know and create genuine curiosity.</a:t>
             </a:r>
           </a:p>
         </p:txBody>
@@ -1145,7 +1145,7 @@
           <a:lstStyle/>
           <a:p>
             <a:r>
-              <a:t>Stories create empathy. Empathy creates understanding. This is how "light bulbs" turn on.</a:t>
+              <a:t>This was Baldwin's secret—individual stories make abstract history concrete. Stories create empathy. Empathy creates understanding. That's when light bulbs turn on.</a:t>
             </a:r>
           </a:p>
         </p:txBody>
@@ -1215,7 +1215,7 @@
           <a:lstStyle/>
           <a:p>
             <a:r>
-              <a:t>This chart is worth posting in a classroom. The "is not" column addresses common fears.</a:t>
+              <a:t>The IS NOT column addresses common fears teachers have. Worth posting in a classroom.</a:t>
             </a:r>
           </a:p>
         </p:txBody>
@@ -1285,7 +1285,7 @@
           <a:lstStyle/>
           <a:p>
             <a:r>
-              <a:t>"Primary sources" = original documents/texts from the time period. Spell out terms like this.</a:t>
+              <a:t>Everyone can engage with civil rights. You adjust complexity, never importance. "Primary sources" means original documents from the time period.</a:t>
             </a:r>
           </a:p>
         </p:txBody>
@@ -1355,7 +1355,7 @@
           <a:lstStyle/>
           <a:p>
             <a:r>
-              <a:t>This is about developing professional identity, not just following recipes.</a:t>
+              <a:t>Rules help you start. Intuition helps you grow. This is about developing your professional identity—heavy on stories or analysis? Discussion-based or project-based? There's no single right answer.</a:t>
             </a:r>
           </a:p>
         </p:txBody>
@@ -4426,7 +4426,7 @@
               </a:defRPr>
             </a:pPr>
             <a:r>
-              <a:t>How to Help Students of All Ages Connect with History</a:t>
+              <a:t>Helping Students Connect with History</a:t>
             </a:r>
           </a:p>
         </p:txBody>
@@ -4479,7 +4479,7 @@
               </a:defRPr>
             </a:pPr>
             <a:r>
-              <a:t>Building Your Teaching Intuition</a:t>
+              <a:t>Building Your Intuition</a:t>
             </a:r>
           </a:p>
         </p:txBody>
@@ -4517,7 +4517,7 @@
               </a:defRPr>
             </a:pPr>
             <a:r>
-              <a:t>Rules help you start. Intuition helps you grow.</a:t>
+              <a:t>Over time, you'll sense:</a:t>
             </a:r>
           </a:p>
           <a:p>
@@ -4532,7 +4532,7 @@
               </a:defRPr>
             </a:pPr>
             <a:r>
-              <a:t>As you practice teaching civil rights, you'll develop gut feelings about:</a:t>
+              <a:t>• When to push deeper vs. pause</a:t>
             </a:r>
           </a:p>
           <a:p>
@@ -4547,7 +4547,7 @@
               </a:defRPr>
             </a:pPr>
             <a:r>
-              <a:t>• en to push deeper vs. when to pause</a:t>
+              <a:t>• Which stories resonate</a:t>
             </a:r>
           </a:p>
           <a:p>
@@ -4562,7 +4562,7 @@
               </a:defRPr>
             </a:pPr>
             <a:r>
-              <a:t>• ich stories resonate with which students</a:t>
+              <a:t>• How much context different ages need</a:t>
             </a:r>
           </a:p>
           <a:p>
@@ -4577,97 +4577,7 @@
               </a:defRPr>
             </a:pPr>
             <a:r>
-              <a:t>• w much context different ages need</a:t>
-            </a:r>
-          </a:p>
-          <a:p>
-            <a:pPr>
-              <a:spcAft>
-                <a:spcPts val="800"/>
-              </a:spcAft>
-              <a:defRPr sz="1800">
-                <a:solidFill>
-                  <a:srgbClr val="2D3748"/>
-                </a:solidFill>
-              </a:defRPr>
-            </a:pPr>
-            <a:r>
-              <a:t>• en a discussion is productive vs. spinning wheels</a:t>
-            </a:r>
-          </a:p>
-          <a:p>
-            <a:pPr>
-              <a:spcAft>
-                <a:spcPts val="800"/>
-              </a:spcAft>
-              <a:defRPr sz="1800">
-                <a:solidFill>
-                  <a:srgbClr val="2D3748"/>
-                </a:solidFill>
-              </a:defRPr>
-            </a:pPr>
-            <a:r>
-              <a:t>Developing your taste: What kind of civil rights teacher do YOU want to be?</a:t>
-            </a:r>
-          </a:p>
-          <a:p>
-            <a:pPr>
-              <a:spcAft>
-                <a:spcPts val="800"/>
-              </a:spcAft>
-              <a:defRPr sz="1800">
-                <a:solidFill>
-                  <a:srgbClr val="2D3748"/>
-                </a:solidFill>
-              </a:defRPr>
-            </a:pPr>
-            <a:r>
-              <a:t>• avy on stories? Heavy on analysis?</a:t>
-            </a:r>
-          </a:p>
-          <a:p>
-            <a:pPr>
-              <a:spcAft>
-                <a:spcPts val="800"/>
-              </a:spcAft>
-              <a:defRPr sz="1800">
-                <a:solidFill>
-                  <a:srgbClr val="2D3748"/>
-                </a:solidFill>
-              </a:defRPr>
-            </a:pPr>
-            <a:r>
-              <a:t>• scussion-based? Project-based?</a:t>
-            </a:r>
-          </a:p>
-          <a:p>
-            <a:pPr>
-              <a:spcAft>
-                <a:spcPts val="800"/>
-              </a:spcAft>
-              <a:defRPr sz="1800">
-                <a:solidFill>
-                  <a:srgbClr val="2D3748"/>
-                </a:solidFill>
-              </a:defRPr>
-            </a:pPr>
-            <a:r>
-              <a:t>• rrent events focus? Historical focus?</a:t>
-            </a:r>
-          </a:p>
-          <a:p>
-            <a:pPr>
-              <a:spcAft>
-                <a:spcPts val="800"/>
-              </a:spcAft>
-              <a:defRPr sz="1800">
-                <a:solidFill>
-                  <a:srgbClr val="2D3748"/>
-                </a:solidFill>
-              </a:defRPr>
-            </a:pPr>
-            <a:r>
-              <a:t>There's no single right answer. But there ARE informed choices you'll make.</a:t>
+              <a:t>What kind of civil rights teacher do YOU want to be?</a:t>
             </a:r>
           </a:p>
         </p:txBody>
@@ -4720,7 +4630,7 @@
               </a:defRPr>
             </a:pPr>
             <a:r>
-              <a:t>Common Pitfalls (Learn from Others' Mistakes)</a:t>
+              <a:t>Common Pitfalls</a:t>
             </a:r>
           </a:p>
         </p:txBody>
@@ -4758,7 +4668,7 @@
               </a:defRPr>
             </a:pPr>
             <a:r>
-              <a:t>Oversimplifying: "Good guys won, bad guys lost" → Misses the ongoing nature of the work</a:t>
+              <a:t>• Oversimplifying: "Good guys won, bad guys lost"</a:t>
             </a:r>
           </a:p>
           <a:p>
@@ -4773,7 +4683,7 @@
               </a:defRPr>
             </a:pPr>
             <a:r>
-              <a:t>Avoiding discomfort: Skipping hard topics → Students sense the avoidance, lose trust</a:t>
+              <a:t>• Avoiding discomfort: Students sense it</a:t>
             </a:r>
           </a:p>
           <a:p>
@@ -4788,7 +4698,7 @@
               </a:defRPr>
             </a:pPr>
             <a:r>
-              <a:t>Assuming sameness: "All students come in knowing nothing" → Disrespects their experiences</a:t>
+              <a:t>• Assuming sameness: Disrespects their experiences</a:t>
             </a:r>
           </a:p>
           <a:p>
@@ -4803,22 +4713,7 @@
               </a:defRPr>
             </a:pPr>
             <a:r>
-              <a:t>Overcorrecting: Making it so heavy students shut down → Misses the hope in the history</a:t>
-            </a:r>
-          </a:p>
-          <a:p>
-            <a:pPr>
-              <a:spcAft>
-                <a:spcPts val="800"/>
-              </a:spcAft>
-              <a:defRPr sz="1800">
-                <a:solidFill>
-                  <a:srgbClr val="2D3748"/>
-                </a:solidFill>
-              </a:defRPr>
-            </a:pPr>
-            <a:r>
-              <a:t>The balanced approach: Honest about difficulty, clear about progress, open to student responses.</a:t>
+              <a:t>• Overcorrecting: So heavy students shut down</a:t>
             </a:r>
           </a:p>
         </p:txBody>
@@ -4871,7 +4766,7 @@
               </a:defRPr>
             </a:pPr>
             <a:r>
-              <a:t>Making Connections: The Whole Point</a:t>
+              <a:t>Key Takeaways</a:t>
             </a:r>
           </a:p>
         </p:txBody>
@@ -4909,7 +4804,7 @@
               </a:defRPr>
             </a:pPr>
             <a:r>
-              <a:t>Before we break into groups, here's what I want you to take away:</a:t>
+              <a:t>1. Connection, not coverage</a:t>
             </a:r>
           </a:p>
           <a:p>
@@ -4924,7 +4819,7 @@
               </a:defRPr>
             </a:pPr>
             <a:r>
-              <a:t>1. Civil rights teaching is about connection, not coverage</a:t>
+              <a:t>2. Personal stories + present relevance</a:t>
             </a:r>
           </a:p>
           <a:p>
@@ -4939,7 +4834,7 @@
               </a:defRPr>
             </a:pPr>
             <a:r>
-              <a:t>2. Baldwin's approach works: personal stories + present relevance</a:t>
+              <a:t>3. Adjust for age, never skip the topic</a:t>
             </a:r>
           </a:p>
           <a:p>
@@ -4954,52 +4849,7 @@
               </a:defRPr>
             </a:pPr>
             <a:r>
-              <a:t>3. Adjust for age and readiness, but never skip the topic</a:t>
-            </a:r>
-          </a:p>
-          <a:p>
-            <a:pPr>
-              <a:spcAft>
-                <a:spcPts val="800"/>
-              </a:spcAft>
-              <a:defRPr sz="1800">
-                <a:solidFill>
-                  <a:srgbClr val="2D3748"/>
-                </a:solidFill>
-              </a:defRPr>
-            </a:pPr>
-            <a:r>
-              <a:t>4. Your own teaching style will emerge through practice</a:t>
-            </a:r>
-          </a:p>
-          <a:p>
-            <a:pPr>
-              <a:spcAft>
-                <a:spcPts val="800"/>
-              </a:spcAft>
-              <a:defRPr sz="1800">
-                <a:solidFill>
-                  <a:srgbClr val="2D3748"/>
-                </a:solidFill>
-              </a:defRPr>
-            </a:pPr>
-            <a:r>
-              <a:t>The light bulb moment we want for YOUR future students:</a:t>
-            </a:r>
-          </a:p>
-          <a:p>
-            <a:pPr>
-              <a:spcAft>
-                <a:spcPts val="800"/>
-              </a:spcAft>
-              <a:defRPr sz="1800">
-                <a:solidFill>
-                  <a:srgbClr val="2D3748"/>
-                </a:solidFill>
-              </a:defRPr>
-            </a:pPr>
-            <a:r>
-              <a:t>"This history is MY history. I'm part of this story."</a:t>
+              <a:t>4. Your style emerges through practice</a:t>
             </a:r>
           </a:p>
         </p:txBody>
@@ -5052,7 +4902,7 @@
               </a:defRPr>
             </a:pPr>
             <a:r>
-              <a:t>Group Discussion Time</a:t>
+              <a:t>Group Discussion</a:t>
             </a:r>
           </a:p>
         </p:txBody>
@@ -5090,7 +4940,7 @@
               </a:defRPr>
             </a:pPr>
             <a:r>
-              <a:t>Now you'll work in groups to apply these ideas.</a:t>
+              <a:t>Instructions:</a:t>
             </a:r>
           </a:p>
           <a:p>
@@ -5105,7 +4955,7 @@
               </a:defRPr>
             </a:pPr>
             <a:r>
-              <a:t>Instructions:</a:t>
+              <a:t>• Read prompts on your device</a:t>
             </a:r>
           </a:p>
           <a:p>
@@ -5120,7 +4970,7 @@
               </a:defRPr>
             </a:pPr>
             <a:r>
-              <a:t>• ad each prompt on your computer</a:t>
+              <a:t>• Discuss verbally with your group</a:t>
             </a:r>
           </a:p>
           <a:p>
@@ -5135,7 +4985,7 @@
               </a:defRPr>
             </a:pPr>
             <a:r>
-              <a:t>• scuss with your group verbally</a:t>
+              <a:t>• Summarize key points on paper</a:t>
             </a:r>
           </a:p>
           <a:p>
@@ -5150,52 +5000,7 @@
               </a:defRPr>
             </a:pPr>
             <a:r>
-              <a:t>• mmarize key points on paper</a:t>
-            </a:r>
-          </a:p>
-          <a:p>
-            <a:pPr>
-              <a:spcAft>
-                <a:spcPts val="800"/>
-              </a:spcAft>
-              <a:defRPr sz="1800">
-                <a:solidFill>
-                  <a:srgbClr val="2D3748"/>
-                </a:solidFill>
-              </a:defRPr>
-            </a:pPr>
-            <a:r>
-              <a:t>• ll visit each group to hear your thinking and help you go deeper</a:t>
-            </a:r>
-          </a:p>
-          <a:p>
-            <a:pPr>
-              <a:spcAft>
-                <a:spcPts val="800"/>
-              </a:spcAft>
-              <a:defRPr sz="1800">
-                <a:solidFill>
-                  <a:srgbClr val="2D3748"/>
-                </a:solidFill>
-              </a:defRPr>
-            </a:pPr>
-            <a:r>
-              <a:t>What I'm looking for:</a:t>
-            </a:r>
-          </a:p>
-          <a:p>
-            <a:pPr>
-              <a:spcAft>
-                <a:spcPts val="800"/>
-              </a:spcAft>
-              <a:defRPr sz="1800">
-                <a:solidFill>
-                  <a:srgbClr val="2D3748"/>
-                </a:solidFill>
-              </a:defRPr>
-            </a:pPr>
-            <a:r>
-              <a:t>Connections between today's ideas and your own future teaching</a:t>
+              <a:t>I'll visit each group to hear your thinking.</a:t>
             </a:r>
           </a:p>
         </p:txBody>
@@ -5279,119 +5084,14 @@
               <a:spcAft>
                 <a:spcPts val="800"/>
               </a:spcAft>
-              <a:defRPr sz="1800">
+              <a:defRPr i="1" sz="1800">
                 <a:solidFill>
                   <a:srgbClr val="2D3748"/>
                 </a:solidFill>
               </a:defRPr>
             </a:pPr>
             <a:r>
-              <a:t>Key takeaways:</a:t>
-            </a:r>
-          </a:p>
-          <a:p>
-            <a:pPr>
-              <a:spcAft>
-                <a:spcPts val="800"/>
-              </a:spcAft>
-              <a:defRPr sz="1800">
-                <a:solidFill>
-                  <a:srgbClr val="2D3748"/>
-                </a:solidFill>
-              </a:defRPr>
-            </a:pPr>
-            <a:r>
-              <a:t>1. The goal is connection, not just content</a:t>
-            </a:r>
-          </a:p>
-          <a:p>
-            <a:pPr>
-              <a:spcAft>
-                <a:spcPts val="800"/>
-              </a:spcAft>
-              <a:defRPr sz="1800">
-                <a:solidFill>
-                  <a:srgbClr val="2D3748"/>
-                </a:solidFill>
-              </a:defRPr>
-            </a:pPr>
-            <a:r>
-              <a:t>2. Start where students are, build from there</a:t>
-            </a:r>
-          </a:p>
-          <a:p>
-            <a:pPr>
-              <a:spcAft>
-                <a:spcPts val="800"/>
-              </a:spcAft>
-              <a:defRPr sz="1800">
-                <a:solidFill>
-                  <a:srgbClr val="2D3748"/>
-                </a:solidFill>
-              </a:defRPr>
-            </a:pPr>
-            <a:r>
-              <a:t>3. Stories &gt; abstractions</a:t>
-            </a:r>
-          </a:p>
-          <a:p>
-            <a:pPr>
-              <a:spcAft>
-                <a:spcPts val="800"/>
-              </a:spcAft>
-              <a:defRPr sz="1800">
-                <a:solidFill>
-                  <a:srgbClr val="2D3748"/>
-                </a:solidFill>
-              </a:defRPr>
-            </a:pPr>
-            <a:r>
-              <a:t>4. Adjust complexity, not importance</a:t>
-            </a:r>
-          </a:p>
-          <a:p>
-            <a:pPr>
-              <a:spcAft>
-                <a:spcPts val="800"/>
-              </a:spcAft>
-              <a:defRPr sz="1800">
-                <a:solidFill>
-                  <a:srgbClr val="2D3748"/>
-                </a:solidFill>
-              </a:defRPr>
-            </a:pPr>
-            <a:r>
-              <a:t>5. Your teaching intuition will develop over time</a:t>
-            </a:r>
-          </a:p>
-          <a:p>
-            <a:pPr>
-              <a:spcAft>
-                <a:spcPts val="800"/>
-              </a:spcAft>
-              <a:defRPr sz="1800">
-                <a:solidFill>
-                  <a:srgbClr val="2D3748"/>
-                </a:solidFill>
-              </a:defRPr>
-            </a:pPr>
-            <a:r>
-              <a:t>Baldwin's charge to us:</a:t>
-            </a:r>
-          </a:p>
-          <a:p>
-            <a:pPr>
-              <a:spcAft>
-                <a:spcPts val="800"/>
-              </a:spcAft>
-              <a:defRPr sz="1800">
-                <a:solidFill>
-                  <a:srgbClr val="2D3748"/>
-                </a:solidFill>
-              </a:defRPr>
-            </a:pPr>
-            <a:r>
-              <a:t>"The purpose of education... is to create in a person the ability to look at the world for himself."</a:t>
+              <a:t>"The purpose of education... is to create in a person the ability to look at the world for himself." — James Baldwin</a:t>
             </a:r>
           </a:p>
           <a:p>
@@ -5459,7 +5159,7 @@
               </a:defRPr>
             </a:pPr>
             <a:r>
-              <a:t>The Big Idea (Don't Miss This)</a:t>
+              <a:t>The Big Idea</a:t>
             </a:r>
           </a:p>
         </p:txBody>
@@ -5497,7 +5197,7 @@
               </a:defRPr>
             </a:pPr>
             <a:r>
-              <a:t>The goal of teaching civil rights is not memorizing facts—it's helping students see themselves as part of an ongoing story.</a:t>
+              <a:t>Connection &gt; Coverage</a:t>
             </a:r>
           </a:p>
           <a:p>
@@ -5512,22 +5212,7 @@
               </a:defRPr>
             </a:pPr>
             <a:r>
-              <a:t>When a student connects historical struggles to their own sense of fairness, something clicks. That "light bulb moment" is what we're after.</a:t>
-            </a:r>
-          </a:p>
-          <a:p>
-            <a:pPr>
-              <a:spcAft>
-                <a:spcPts val="800"/>
-              </a:spcAft>
-              <a:defRPr sz="1800">
-                <a:solidFill>
-                  <a:srgbClr val="2D3748"/>
-                </a:solidFill>
-              </a:defRPr>
-            </a:pPr>
-            <a:r>
-              <a:t>James Baldwin's writing shows us how: make it personal, make it present, make it matter.</a:t>
+              <a:t>When students see themselves in history, everything clicks.</a:t>
             </a:r>
           </a:p>
         </p:txBody>
@@ -5580,7 +5265,7 @@
               </a:defRPr>
             </a:pPr>
             <a:r>
-              <a:t>Who Was James Baldwin?</a:t>
+              <a:t>James Baldwin (1924-1987)</a:t>
             </a:r>
           </a:p>
         </p:txBody>
@@ -5618,7 +5303,7 @@
               </a:defRPr>
             </a:pPr>
             <a:r>
-              <a:t>James Baldwin (1924-1987): An American writer who grew up in Harlem, New York.</a:t>
+              <a:t>Writer. Essayist. Teacher (in his own way).</a:t>
             </a:r>
           </a:p>
           <a:p>
@@ -5633,37 +5318,7 @@
               </a:defRPr>
             </a:pPr>
             <a:r>
-              <a:t>He wrote essays, novels, and speeches about race and justice. His words still appear in classrooms today because he did something special: he made big historical ideas feel personal and immediate.</a:t>
-            </a:r>
-          </a:p>
-          <a:p>
-            <a:pPr>
-              <a:spcAft>
-                <a:spcPts val="800"/>
-              </a:spcAft>
-              <a:defRPr sz="1800">
-                <a:solidFill>
-                  <a:srgbClr val="2D3748"/>
-                </a:solidFill>
-              </a:defRPr>
-            </a:pPr>
-            <a:r>
-              <a:t>Why does this matter for you?</a:t>
-            </a:r>
-          </a:p>
-          <a:p>
-            <a:pPr>
-              <a:spcAft>
-                <a:spcPts val="800"/>
-              </a:spcAft>
-              <a:defRPr sz="1800">
-                <a:solidFill>
-                  <a:srgbClr val="2D3748"/>
-                </a:solidFill>
-              </a:defRPr>
-            </a:pPr>
-            <a:r>
-              <a:t>His approach—connecting abstract history to real human experience—is exactly what good teaching looks like.</a:t>
+              <a:t>Made big ideas feel personal.</a:t>
             </a:r>
           </a:p>
         </p:txBody>
@@ -5716,7 +5371,7 @@
               </a:defRPr>
             </a:pPr>
             <a:r>
-              <a:t>The Core Connection</a:t>
+              <a:t>His Key Insight</a:t>
             </a:r>
           </a:p>
         </p:txBody>
@@ -5747,21 +5402,6 @@
               <a:spcAft>
                 <a:spcPts val="800"/>
               </a:spcAft>
-              <a:defRPr sz="1800">
-                <a:solidFill>
-                  <a:srgbClr val="2D3748"/>
-                </a:solidFill>
-              </a:defRPr>
-            </a:pPr>
-            <a:r>
-              <a:t>Here's the insight that changes everything:</a:t>
-            </a:r>
-          </a:p>
-          <a:p>
-            <a:pPr>
-              <a:spcAft>
-                <a:spcPts val="800"/>
-              </a:spcAft>
               <a:defRPr i="1" sz="1800">
                 <a:solidFill>
                   <a:srgbClr val="2D3748"/>
@@ -5769,142 +5409,7 @@
               </a:defRPr>
             </a:pPr>
             <a:r>
-              <a:t>""History is not the past. It is the present.""</a:t>
-            </a:r>
-          </a:p>
-          <a:p>
-            <a:pPr>
-              <a:spcAft>
-                <a:spcPts val="800"/>
-              </a:spcAft>
-              <a:defRPr i="1" sz="1800">
-                <a:solidFill>
-                  <a:srgbClr val="2D3748"/>
-                </a:solidFill>
-              </a:defRPr>
-            </a:pPr>
-            <a:r>
-              <a:t>"— James Baldwin"</a:t>
-            </a:r>
-          </a:p>
-          <a:p>
-            <a:pPr>
-              <a:spcAft>
-                <a:spcPts val="800"/>
-              </a:spcAft>
-              <a:defRPr sz="1800">
-                <a:solidFill>
-                  <a:srgbClr val="2D3748"/>
-                </a:solidFill>
-              </a:defRPr>
-            </a:pPr>
-            <a:r>
-              <a:t>What this means for teaching:</a:t>
-            </a:r>
-          </a:p>
-          <a:p>
-            <a:pPr>
-              <a:spcAft>
-                <a:spcPts val="800"/>
-              </a:spcAft>
-              <a:defRPr sz="1800">
-                <a:solidFill>
-                  <a:srgbClr val="2D3748"/>
-                </a:solidFill>
-              </a:defRPr>
-            </a:pPr>
-            <a:r>
-              <a:t>• vil rights isn't a chapter in a textbook—it's happening now</a:t>
-            </a:r>
-          </a:p>
-          <a:p>
-            <a:pPr>
-              <a:spcAft>
-                <a:spcPts val="800"/>
-              </a:spcAft>
-              <a:defRPr sz="1800">
-                <a:solidFill>
-                  <a:srgbClr val="2D3748"/>
-                </a:solidFill>
-              </a:defRPr>
-            </a:pPr>
-            <a:r>
-              <a:t>• ur students live in a world shaped by this history</a:t>
-            </a:r>
-          </a:p>
-          <a:p>
-            <a:pPr>
-              <a:spcAft>
-                <a:spcPts val="800"/>
-              </a:spcAft>
-              <a:defRPr sz="1800">
-                <a:solidFill>
-                  <a:srgbClr val="2D3748"/>
-                </a:solidFill>
-              </a:defRPr>
-            </a:pPr>
-            <a:r>
-              <a:t>• aching civil rights = helping students understand their world</a:t>
-            </a:r>
-          </a:p>
-          <a:p>
-            <a:pPr>
-              <a:spcAft>
-                <a:spcPts val="800"/>
-              </a:spcAft>
-              <a:defRPr sz="1800">
-                <a:solidFill>
-                  <a:srgbClr val="2D3748"/>
-                </a:solidFill>
-              </a:defRPr>
-            </a:pPr>
-            <a:r>
-              <a:t>What it does NOT mean:</a:t>
-            </a:r>
-          </a:p>
-          <a:p>
-            <a:pPr>
-              <a:spcAft>
-                <a:spcPts val="800"/>
-              </a:spcAft>
-              <a:defRPr sz="1800">
-                <a:solidFill>
-                  <a:srgbClr val="2D3748"/>
-                </a:solidFill>
-              </a:defRPr>
-            </a:pPr>
-            <a:r>
-              <a:t>• 's not about making students feel guilty</a:t>
-            </a:r>
-          </a:p>
-          <a:p>
-            <a:pPr>
-              <a:spcAft>
-                <a:spcPts val="800"/>
-              </a:spcAft>
-              <a:defRPr sz="1800">
-                <a:solidFill>
-                  <a:srgbClr val="2D3748"/>
-                </a:solidFill>
-              </a:defRPr>
-            </a:pPr>
-            <a:r>
-              <a:t>• 's not about memorizing names and dates</a:t>
-            </a:r>
-          </a:p>
-          <a:p>
-            <a:pPr>
-              <a:spcAft>
-                <a:spcPts val="800"/>
-              </a:spcAft>
-              <a:defRPr sz="1800">
-                <a:solidFill>
-                  <a:srgbClr val="2D3748"/>
-                </a:solidFill>
-              </a:defRPr>
-            </a:pPr>
-            <a:r>
-              <a:t>• 's not about "getting through" required content</a:t>
+              <a:t>"History is not the past. It is the present."</a:t>
             </a:r>
           </a:p>
         </p:txBody>
@@ -5957,7 +5462,7 @@
               </a:defRPr>
             </a:pPr>
             <a:r>
-              <a:t>First Principle: Start Where They Are</a:t>
+              <a:t>Start Where They Are</a:t>
             </a:r>
           </a:p>
         </p:txBody>
@@ -6022,7 +5527,7 @@
                         </a:defRPr>
                       </a:pPr>
                       <a:r>
-                        <a:t>They Already Understand</a:t>
+                        <a:t>They Already Get</a:t>
                       </a:r>
                     </a:p>
                   </a:txBody>
@@ -6081,7 +5586,7 @@
                         <a:defRPr sz="1400"/>
                       </a:pPr>
                       <a:r>
-                        <a:t>Fairness, kindness, "that's not fair!"</a:t>
+                        <a:t>Fairness, "that's not fair!"</a:t>
                       </a:r>
                     </a:p>
                   </a:txBody>
@@ -6143,7 +5648,7 @@
                         <a:defRPr sz="1400"/>
                       </a:pPr>
                       <a:r>
-                        <a:t>"Who decides the rules? Can rules be wrong?"</a:t>
+                        <a:t>"Who decides rules? Can rules be wrong?"</a:t>
                       </a:r>
                     </a:p>
                   </a:txBody>
@@ -6248,59 +5753,6 @@
           </a:graphicData>
         </a:graphic>
       </p:graphicFrame>
-      <p:sp>
-        <p:nvSpPr>
-          <p:cNvPr id="4" name="TextBox 3"/>
-          <p:cNvSpPr txBox="1"/>
-          <p:nvPr/>
-        </p:nvSpPr>
-        <p:spPr>
-          <a:xfrm>
-            <a:off x="457200" y="3566160"/>
-            <a:ext cx="11277295" cy="4572000"/>
-          </a:xfrm>
-          <a:prstGeom prst="rect">
-            <a:avLst/>
-          </a:prstGeom>
-          <a:noFill/>
-        </p:spPr>
-        <p:txBody>
-          <a:bodyPr wrap="square">
-            <a:spAutoFit/>
-          </a:bodyPr>
-          <a:lstStyle/>
-          <a:p>
-            <a:pPr>
-              <a:spcAft>
-                <a:spcPts val="800"/>
-              </a:spcAft>
-              <a:defRPr sz="1800">
-                <a:solidFill>
-                  <a:srgbClr val="2D3748"/>
-                </a:solidFill>
-              </a:defRPr>
-            </a:pPr>
-            <a:r>
-              <a:t>Building from first principles means:</a:t>
-            </a:r>
-          </a:p>
-          <a:p>
-            <a:pPr>
-              <a:spcAft>
-                <a:spcPts val="800"/>
-              </a:spcAft>
-              <a:defRPr sz="1800">
-                <a:solidFill>
-                  <a:srgbClr val="2D3748"/>
-                </a:solidFill>
-              </a:defRPr>
-            </a:pPr>
-            <a:r>
-              <a:t>Starting with what students already understand, then building up.</a:t>
-            </a:r>
-          </a:p>
-        </p:txBody>
-      </p:sp>
     </p:spTree>
   </p:cSld>
   <p:clrMapOvr>
@@ -6349,7 +5801,7 @@
               </a:defRPr>
             </a:pPr>
             <a:r>
-              <a:t>Questions vs. Answers: A Key Choice</a:t>
+              <a:t>Questions &gt; Answers</a:t>
             </a:r>
           </a:p>
         </p:txBody>
@@ -6387,7 +5839,7 @@
               </a:defRPr>
             </a:pPr>
             <a:r>
-              <a:t>Two ways to start a civil rights lesson:</a:t>
+              <a:t>❌ "The Civil Rights Movement was a period from 1954-1968..."</a:t>
             </a:r>
           </a:p>
           <a:p>
@@ -6402,187 +5854,7 @@
               </a:defRPr>
             </a:pPr>
             <a:r>
-              <a:t>❌ Answer-first approach:</a:t>
-            </a:r>
-          </a:p>
-          <a:p>
-            <a:pPr>
-              <a:spcAft>
-                <a:spcPts val="800"/>
-              </a:spcAft>
-              <a:defRPr sz="1800">
-                <a:solidFill>
-                  <a:srgbClr val="2D3748"/>
-                </a:solidFill>
-              </a:defRPr>
-            </a:pPr>
-            <a:r>
-              <a:t>"The Civil Rights Movement was a period from 1954-1968 when African Americans fought for equal rights..."</a:t>
-            </a:r>
-          </a:p>
-          <a:p>
-            <a:pPr>
-              <a:spcAft>
-                <a:spcPts val="800"/>
-              </a:spcAft>
-              <a:defRPr sz="1800">
-                <a:solidFill>
-                  <a:srgbClr val="2D3748"/>
-                </a:solidFill>
-              </a:defRPr>
-            </a:pPr>
-            <a:r>
-              <a:t>✅ Question-first approach:</a:t>
-            </a:r>
-          </a:p>
-          <a:p>
-            <a:pPr>
-              <a:spcAft>
-                <a:spcPts val="800"/>
-              </a:spcAft>
-              <a:defRPr sz="1800">
-                <a:solidFill>
-                  <a:srgbClr val="2D3748"/>
-                </a:solidFill>
-              </a:defRPr>
-            </a:pPr>
-            <a:r>
-              <a:t>"Think about a time something felt unfair to you. What did you want to happen?"</a:t>
-            </a:r>
-          </a:p>
-          <a:p>
-            <a:pPr>
-              <a:spcAft>
-                <a:spcPts val="800"/>
-              </a:spcAft>
-              <a:defRPr sz="1800">
-                <a:solidFill>
-                  <a:srgbClr val="2D3748"/>
-                </a:solidFill>
-              </a:defRPr>
-            </a:pPr>
-            <a:r>
-              <a:t>Why questions work better:</a:t>
-            </a:r>
-          </a:p>
-          <a:p>
-            <a:pPr>
-              <a:spcAft>
-                <a:spcPts val="800"/>
-              </a:spcAft>
-              <a:defRPr sz="1800">
-                <a:solidFill>
-                  <a:srgbClr val="2D3748"/>
-                </a:solidFill>
-              </a:defRPr>
-            </a:pPr>
-            <a:r>
-              <a:t>• udents engage their own thinking</a:t>
-            </a:r>
-          </a:p>
-          <a:p>
-            <a:pPr>
-              <a:spcAft>
-                <a:spcPts val="800"/>
-              </a:spcAft>
-              <a:defRPr sz="1800">
-                <a:solidFill>
-                  <a:srgbClr val="2D3748"/>
-                </a:solidFill>
-              </a:defRPr>
-            </a:pPr>
-            <a:r>
-              <a:t>• nors what they already know</a:t>
-            </a:r>
-          </a:p>
-          <a:p>
-            <a:pPr>
-              <a:spcAft>
-                <a:spcPts val="800"/>
-              </a:spcAft>
-              <a:defRPr sz="1800">
-                <a:solidFill>
-                  <a:srgbClr val="2D3748"/>
-                </a:solidFill>
-              </a:defRPr>
-            </a:pPr>
-            <a:r>
-              <a:t>• eates genuine curiosity</a:t>
-            </a:r>
-          </a:p>
-          <a:p>
-            <a:pPr>
-              <a:spcAft>
-                <a:spcPts val="800"/>
-              </a:spcAft>
-              <a:defRPr sz="1800">
-                <a:solidFill>
-                  <a:srgbClr val="2D3748"/>
-                </a:solidFill>
-              </a:defRPr>
-            </a:pPr>
-            <a:r>
-              <a:t>• rks at EVERY grade level</a:t>
-            </a:r>
-          </a:p>
-          <a:p>
-            <a:pPr>
-              <a:spcAft>
-                <a:spcPts val="800"/>
-              </a:spcAft>
-              <a:defRPr sz="1800">
-                <a:solidFill>
-                  <a:srgbClr val="2D3748"/>
-                </a:solidFill>
-              </a:defRPr>
-            </a:pPr>
-            <a:r>
-              <a:t>This is NOT:</a:t>
-            </a:r>
-          </a:p>
-          <a:p>
-            <a:pPr>
-              <a:spcAft>
-                <a:spcPts val="800"/>
-              </a:spcAft>
-              <a:defRPr sz="1800">
-                <a:solidFill>
-                  <a:srgbClr val="2D3748"/>
-                </a:solidFill>
-              </a:defRPr>
-            </a:pPr>
-            <a:r>
-              <a:t>• oiding the hard facts</a:t>
-            </a:r>
-          </a:p>
-          <a:p>
-            <a:pPr>
-              <a:spcAft>
-                <a:spcPts val="800"/>
-              </a:spcAft>
-              <a:defRPr sz="1800">
-                <a:solidFill>
-                  <a:srgbClr val="2D3748"/>
-                </a:solidFill>
-              </a:defRPr>
-            </a:pPr>
-            <a:r>
-              <a:t>• tting students believe whatever they want</a:t>
-            </a:r>
-          </a:p>
-          <a:p>
-            <a:pPr>
-              <a:spcAft>
-                <a:spcPts val="800"/>
-              </a:spcAft>
-              <a:defRPr sz="1800">
-                <a:solidFill>
-                  <a:srgbClr val="2D3748"/>
-                </a:solidFill>
-              </a:defRPr>
-            </a:pPr>
-            <a:r>
-              <a:t>• ing wishy-washy</a:t>
+              <a:t>✅ "Think about a time something felt unfair. What did you want to happen?"</a:t>
             </a:r>
           </a:p>
         </p:txBody>
@@ -6635,7 +5907,7 @@
               </a:defRPr>
             </a:pPr>
             <a:r>
-              <a:t>The Power of Stories (Baldwin's Secret)</a:t>
+              <a:t>Stories &gt; Abstractions</a:t>
             </a:r>
           </a:p>
         </p:txBody>
@@ -6676,7 +5948,7 @@
                         </a:defRPr>
                       </a:pPr>
                       <a:r>
-                        <a:t>Abstract</a:t>
+                        <a:t>Don't Say</a:t>
                       </a:r>
                     </a:p>
                   </a:txBody>
@@ -6699,7 +5971,7 @@
                         </a:defRPr>
                       </a:pPr>
                       <a:r>
-                        <a:t>Concrete (Story)</a:t>
+                        <a:t>Say Instead</a:t>
                       </a:r>
                     </a:p>
                   </a:txBody>
@@ -6735,7 +6007,7 @@
                         <a:defRPr sz="1400"/>
                       </a:pPr>
                       <a:r>
-                        <a:t>"Ruby Bridges, age 6, walked past angry crowds to attend first grade"</a:t>
+                        <a:t>"Ruby Bridges, age 6, walked past angry crowds"</a:t>
                       </a:r>
                     </a:p>
                   </a:txBody>
@@ -6767,7 +6039,7 @@
                         <a:defRPr sz="1400"/>
                       </a:pPr>
                       <a:r>
-                        <a:t>"John Lewis, age 23, was beaten on a bridge for marching"</a:t>
+                        <a:t>"John Lewis, age 23, was beaten on a bridge"</a:t>
                       </a:r>
                     </a:p>
                   </a:txBody>
@@ -6799,7 +6071,7 @@
                         <a:defRPr sz="1400"/>
                       </a:pPr>
                       <a:r>
-                        <a:t>"Claudette Colvin, age 15, refused to give up her bus seat—9 months before Rosa Parks"</a:t>
+                        <a:t>"Claudette Colvin, age 15, refused her seat"</a:t>
                       </a:r>
                     </a:p>
                   </a:txBody>
@@ -6843,52 +6115,7 @@
               </a:defRPr>
             </a:pPr>
             <a:r>
-              <a:t>Baldwin didn't write reports. He wrote stories about real people.</a:t>
-            </a:r>
-          </a:p>
-          <a:p>
-            <a:pPr>
-              <a:spcAft>
-                <a:spcPts val="800"/>
-              </a:spcAft>
-              <a:defRPr sz="1800">
-                <a:solidFill>
-                  <a:srgbClr val="2D3748"/>
-                </a:solidFill>
-              </a:defRPr>
-            </a:pPr>
-            <a:r>
-              <a:t>That's his teaching secret: Individual stories make abstract history concrete.</a:t>
-            </a:r>
-          </a:p>
-          <a:p>
-            <a:pPr>
-              <a:spcAft>
-                <a:spcPts val="800"/>
-              </a:spcAft>
-              <a:defRPr sz="1800">
-                <a:solidFill>
-                  <a:srgbClr val="2D3748"/>
-                </a:solidFill>
-              </a:defRPr>
-            </a:pPr>
-            <a:r>
-              <a:t>Example transformation:</a:t>
-            </a:r>
-          </a:p>
-          <a:p>
-            <a:pPr>
-              <a:spcAft>
-                <a:spcPts val="800"/>
-              </a:spcAft>
-              <a:defRPr sz="1800">
-                <a:solidFill>
-                  <a:srgbClr val="2D3748"/>
-                </a:solidFill>
-              </a:defRPr>
-            </a:pPr>
-            <a:r>
-              <a:t>Connection moment: When students hear about a 6-year-old or a 15-year-old, they think: "That could be me."</a:t>
+              <a:t>They think: "That could be me."</a:t>
             </a:r>
           </a:p>
         </p:txBody>
@@ -6941,7 +6168,7 @@
               </a:defRPr>
             </a:pPr>
             <a:r>
-              <a:t>What Teaching Civil Rights IS and IS NOT</a:t>
+              <a:t>What It IS vs. IS NOT</a:t>
             </a:r>
           </a:p>
         </p:txBody>
@@ -6982,7 +6209,7 @@
                         </a:defRPr>
                       </a:pPr>
                       <a:r>
-                        <a:t>Teaching Civil Rights IS...</a:t>
+                        <a:t>IS</a:t>
                       </a:r>
                     </a:p>
                   </a:txBody>
@@ -7005,7 +6232,7 @@
                         </a:defRPr>
                       </a:pPr>
                       <a:r>
-                        <a:t>Teaching Civil Rights is NOT...</a:t>
+                        <a:t>IS NOT</a:t>
                       </a:r>
                     </a:p>
                   </a:txBody>
@@ -7026,7 +6253,7 @@
                         <a:defRPr sz="1400"/>
                       </a:pPr>
                       <a:r>
-                        <a:t>Helping students understand our shared history</a:t>
+                        <a:t>Understanding shared history</a:t>
                       </a:r>
                     </a:p>
                   </a:txBody>
@@ -7041,7 +6268,7 @@
                         <a:defRPr sz="1400"/>
                       </a:pPr>
                       <a:r>
-                        <a:t>Making any student feel personally guilty</a:t>
+                        <a:t>Making anyone feel guilty</a:t>
                       </a:r>
                     </a:p>
                   </a:txBody>
@@ -7090,7 +6317,7 @@
                         <a:defRPr sz="1400"/>
                       </a:pPr>
                       <a:r>
-                        <a:t>Developmentally appropriate honesty</a:t>
+                        <a:t>Age-appropriate honesty</a:t>
                       </a:r>
                     </a:p>
                   </a:txBody>
@@ -7105,7 +6332,7 @@
                         <a:defRPr sz="1400"/>
                       </a:pPr>
                       <a:r>
-                        <a:t>Traumatizing young children with graphic details</a:t>
+                        <a:t>Traumatizing with graphic details</a:t>
                       </a:r>
                     </a:p>
                   </a:txBody>
@@ -7122,7 +6349,7 @@
                         <a:defRPr sz="1400"/>
                       </a:pPr>
                       <a:r>
-                        <a:t>Building empathy and critical thinking</a:t>
+                        <a:t>Building empathy</a:t>
                       </a:r>
                     </a:p>
                   </a:txBody>
@@ -7137,7 +6364,7 @@
                         <a:defRPr sz="1400"/>
                       </a:pPr>
                       <a:r>
-                        <a:t>Telling students what to think politically</a:t>
+                        <a:t>Telling students what to think</a:t>
                       </a:r>
                     </a:p>
                   </a:txBody>
@@ -7169,7 +6396,7 @@
                         <a:defRPr sz="1400"/>
                       </a:pPr>
                       <a:r>
-                        <a:t>One-and-done checkbox lesson</a:t>
+                        <a:t>One-and-done checkbox</a:t>
                       </a:r>
                     </a:p>
                   </a:txBody>
@@ -7180,44 +6407,6 @@
           </a:graphicData>
         </a:graphic>
       </p:graphicFrame>
-      <p:sp>
-        <p:nvSpPr>
-          <p:cNvPr id="4" name="TextBox 3"/>
-          <p:cNvSpPr txBox="1"/>
-          <p:nvPr/>
-        </p:nvSpPr>
-        <p:spPr>
-          <a:xfrm>
-            <a:off x="457200" y="3566160"/>
-            <a:ext cx="11277295" cy="4572000"/>
-          </a:xfrm>
-          <a:prstGeom prst="rect">
-            <a:avLst/>
-          </a:prstGeom>
-          <a:noFill/>
-        </p:spPr>
-        <p:txBody>
-          <a:bodyPr wrap="square">
-            <a:spAutoFit/>
-          </a:bodyPr>
-          <a:lstStyle/>
-          <a:p>
-            <a:pPr>
-              <a:spcAft>
-                <a:spcPts val="800"/>
-              </a:spcAft>
-              <a:defRPr sz="1800">
-                <a:solidFill>
-                  <a:srgbClr val="2D3748"/>
-                </a:solidFill>
-              </a:defRPr>
-            </a:pPr>
-            <a:r>
-              <a:t>Your developing intuition: As you gain experience, you'll sense where that line is for your specific students.</a:t>
-            </a:r>
-          </a:p>
-        </p:txBody>
-      </p:sp>
     </p:spTree>
   </p:cSld>
   <p:clrMapOvr>
@@ -7266,7 +6455,7 @@
               </a:defRPr>
             </a:pPr>
             <a:r>
-              <a:t>Adapting for Different Learners</a:t>
+              <a:t>Adapting for Learners</a:t>
             </a:r>
           </a:p>
         </p:txBody>
@@ -7304,7 +6493,7 @@
               </a:defRPr>
             </a:pPr>
             <a:r>
-              <a:t>Differentiation means adjusting HOW you teach, not WHETHER you teach.</a:t>
+              <a:t>Need more support:</a:t>
             </a:r>
           </a:p>
           <a:p>
@@ -7319,7 +6508,7 @@
               </a:defRPr>
             </a:pPr>
             <a:r>
-              <a:t>For students who need more support:</a:t>
+              <a:t>• More visuals, fewer words</a:t>
             </a:r>
           </a:p>
           <a:p>
@@ -7334,7 +6523,7 @@
               </a:defRPr>
             </a:pPr>
             <a:r>
-              <a:t>• re visuals, fewer words</a:t>
+              <a:t>• Pre-teach vocabulary</a:t>
             </a:r>
           </a:p>
           <a:p>
@@ -7349,7 +6538,7 @@
               </a:defRPr>
             </a:pPr>
             <a:r>
-              <a:t>• cabulary pre-teaching (define terms before using them)</a:t>
+              <a:t>• Sentence starters</a:t>
             </a:r>
           </a:p>
           <a:p>
@@ -7364,7 +6553,7 @@
               </a:defRPr>
             </a:pPr>
             <a:r>
-              <a:t>• er partnerships during discussions</a:t>
+              <a:t>Ready for more:</a:t>
             </a:r>
           </a:p>
           <a:p>
@@ -7379,7 +6568,7 @@
               </a:defRPr>
             </a:pPr>
             <a:r>
-              <a:t>• ntence starters: "I think... because..."</a:t>
+              <a:t>• Original Baldwin texts</a:t>
             </a:r>
           </a:p>
           <a:p>
@@ -7394,7 +6583,7 @@
               </a:defRPr>
             </a:pPr>
             <a:r>
-              <a:t>For students ready for more challenge:</a:t>
+              <a:t>• Cross-curricular connections</a:t>
             </a:r>
           </a:p>
           <a:p>
@@ -7409,52 +6598,7 @@
               </a:defRPr>
             </a:pPr>
             <a:r>
-              <a:t>• iginal Baldwin texts (primary sources—the actual documents from history)</a:t>
-            </a:r>
-          </a:p>
-          <a:p>
-            <a:pPr>
-              <a:spcAft>
-                <a:spcPts val="800"/>
-              </a:spcAft>
-              <a:defRPr sz="1800">
-                <a:solidFill>
-                  <a:srgbClr val="2D3748"/>
-                </a:solidFill>
-              </a:defRPr>
-            </a:pPr>
-            <a:r>
-              <a:t>• oss-curricular connections (How does this connect to art? Music? Science?)</a:t>
-            </a:r>
-          </a:p>
-          <a:p>
-            <a:pPr>
-              <a:spcAft>
-                <a:spcPts val="800"/>
-              </a:spcAft>
-              <a:defRPr sz="1800">
-                <a:solidFill>
-                  <a:srgbClr val="2D3748"/>
-                </a:solidFill>
-              </a:defRPr>
-            </a:pPr>
-            <a:r>
-              <a:t>• adership roles: "Can you help explain this to your group?"</a:t>
-            </a:r>
-          </a:p>
-          <a:p>
-            <a:pPr>
-              <a:spcAft>
-                <a:spcPts val="800"/>
-              </a:spcAft>
-              <a:defRPr sz="1800">
-                <a:solidFill>
-                  <a:srgbClr val="2D3748"/>
-                </a:solidFill>
-              </a:defRPr>
-            </a:pPr>
-            <a:r>
-              <a:t>Key insight: Everyone can engage with civil rights. You adjust the complexity, never the importance.</a:t>
+              <a:t>• Leadership roles</a:t>
             </a:r>
           </a:p>
         </p:txBody>

</xml_diff>